<commit_message>
Revert "merge with james"
</commit_message>
<xml_diff>
--- a/Dissertation Defense_100314.pptx
+++ b/Dissertation Defense_100314.pptx
@@ -380,11 +380,11 @@
         </c:dLbls>
         <c:gapWidth val="55"/>
         <c:overlap val="100"/>
-        <c:axId val="2089346024"/>
-        <c:axId val="-2085677976"/>
+        <c:axId val="-2102219640"/>
+        <c:axId val="-2102216856"/>
       </c:barChart>
       <c:catAx>
-        <c:axId val="2089346024"/>
+        <c:axId val="-2102219640"/>
         <c:scaling>
           <c:orientation val="minMax"/>
         </c:scaling>
@@ -393,7 +393,7 @@
         <c:majorTickMark val="none"/>
         <c:minorTickMark val="none"/>
         <c:tickLblPos val="nextTo"/>
-        <c:crossAx val="-2085677976"/>
+        <c:crossAx val="-2102216856"/>
         <c:crosses val="autoZero"/>
         <c:auto val="1"/>
         <c:lblAlgn val="ctr"/>
@@ -401,7 +401,7 @@
         <c:noMultiLvlLbl val="0"/>
       </c:catAx>
       <c:valAx>
-        <c:axId val="-2085677976"/>
+        <c:axId val="-2102216856"/>
         <c:scaling>
           <c:orientation val="minMax"/>
         </c:scaling>
@@ -411,13 +411,14 @@
         <c:majorTickMark val="none"/>
         <c:minorTickMark val="none"/>
         <c:tickLblPos val="nextTo"/>
-        <c:crossAx val="2089346024"/>
+        <c:crossAx val="-2102219640"/>
         <c:crosses val="autoZero"/>
         <c:crossBetween val="between"/>
       </c:valAx>
     </c:plotArea>
     <c:legend>
       <c:legendPos val="r"/>
+      <c:layout/>
       <c:overlay val="0"/>
     </c:legend>
     <c:plotVisOnly val="1"/>
@@ -15409,8 +15410,8 @@
         </p:nvSpPr>
         <p:spPr>
           <a:xfrm>
-            <a:off x="457200" y="1248607"/>
-            <a:ext cx="5540965" cy="4087320"/>
+            <a:off x="457200" y="356549"/>
+            <a:ext cx="8229600" cy="5769614"/>
           </a:xfrm>
         </p:spPr>
         <p:txBody>
@@ -15423,10 +15424,7 @@
               <a:buNone/>
             </a:pPr>
             <a:r>
-              <a:rPr lang="en-US" dirty="0" smtClean="0">
-                <a:latin typeface="Helvetica Neue"/>
-                <a:cs typeface="Helvetica Neue"/>
-              </a:rPr>
+              <a:rPr lang="en-US" dirty="0" smtClean="0"/>
               <a:t>We live in a society that does not trust low-income families – often families of color – to be suitable parents.</a:t>
             </a:r>
           </a:p>
@@ -15434,20 +15432,14 @@
             <a:pPr marL="0" indent="0" algn="ctr">
               <a:buNone/>
             </a:pPr>
-            <a:endParaRPr lang="en-US" dirty="0">
-              <a:latin typeface="Helvetica Neue"/>
-              <a:cs typeface="Helvetica Neue"/>
-            </a:endParaRPr>
+            <a:endParaRPr lang="en-US" dirty="0"/>
           </a:p>
           <a:p>
             <a:pPr marL="0" indent="0" algn="ctr">
               <a:buNone/>
             </a:pPr>
             <a:r>
-              <a:rPr lang="en-US" dirty="0">
-                <a:latin typeface="Helvetica Neue"/>
-                <a:cs typeface="Helvetica Neue"/>
-              </a:rPr>
+              <a:rPr lang="en-US" dirty="0"/>
               <a:t>This lack of trust seeps into schools.</a:t>
             </a:r>
           </a:p>
@@ -15455,10 +15447,7 @@
             <a:pPr marL="0" indent="0" algn="ctr">
               <a:buNone/>
             </a:pPr>
-            <a:endParaRPr lang="en-US" dirty="0">
-              <a:latin typeface="Helvetica Neue"/>
-              <a:cs typeface="Helvetica Neue"/>
-            </a:endParaRPr>
+            <a:endParaRPr lang="en-US" dirty="0"/>
           </a:p>
         </p:txBody>
       </p:sp>

</xml_diff>